<commit_message>
Adjusted the explanation of modus tollens.
</commit_message>
<xml_diff>
--- a/6. Normative Argumentation.pptx
+++ b/6. Normative Argumentation.pptx
@@ -228,7 +228,7 @@
           <a:p>
             <a:fld id="{C20D082D-BBCD-481C-A7DE-212F37A75249}" type="datetimeFigureOut">
               <a:rPr lang="en-US" smtClean="0"/>
-              <a:t>5/17/2023</a:t>
+              <a:t>5/25/2023</a:t>
             </a:fld>
             <a:endParaRPr lang="en-US"/>
           </a:p>
@@ -4399,6 +4399,24 @@
         <p:txBody>
           <a:bodyPr/>
           <a:lstStyle/>
+          <a:p>
+            <a:r>
+              <a:rPr lang="en-US" b="1" dirty="0"/>
+              <a:t>Argument Forms - </a:t>
+            </a:r>
+            <a:r>
+              <a:rPr lang="en-GB" sz="1200" kern="1200" dirty="0">
+                <a:solidFill>
+                  <a:schemeClr val="tx1"/>
+                </a:solidFill>
+                <a:effectLst/>
+                <a:latin typeface="Arial" pitchFamily="-112" charset="0"/>
+                <a:ea typeface="ＭＳ Ｐゴシック" pitchFamily="-112" charset="-128"/>
+                <a:cs typeface="ＭＳ Ｐゴシック" pitchFamily="-112" charset="-128"/>
+              </a:rPr>
+              <a:t>https://www.csm.ornl.gov/~sheldon/ds/sec1.3.html</a:t>
+            </a:r>
+          </a:p>
           <a:p>
             <a:r>
               <a:rPr lang="en-GB" sz="1200" kern="1200" dirty="0">
@@ -7467,7 +7485,7 @@
           <a:p>
             <a:fld id="{3E31344D-F2C8-4FF6-8877-1B13E96E243A}" type="datetimeFigureOut">
               <a:rPr lang="en-US" smtClean="0"/>
-              <a:t>5/17/2023</a:t>
+              <a:t>5/25/2023</a:t>
             </a:fld>
             <a:endParaRPr lang="en-US"/>
           </a:p>
@@ -7756,7 +7774,7 @@
           <a:p>
             <a:fld id="{3E31344D-F2C8-4FF6-8877-1B13E96E243A}" type="datetimeFigureOut">
               <a:rPr lang="en-US" smtClean="0"/>
-              <a:t>5/17/2023</a:t>
+              <a:t>5/25/2023</a:t>
             </a:fld>
             <a:endParaRPr lang="en-US"/>
           </a:p>
@@ -8045,7 +8063,7 @@
           <a:p>
             <a:fld id="{3E31344D-F2C8-4FF6-8877-1B13E96E243A}" type="datetimeFigureOut">
               <a:rPr lang="en-US" smtClean="0"/>
-              <a:t>5/17/2023</a:t>
+              <a:t>5/25/2023</a:t>
             </a:fld>
             <a:endParaRPr lang="en-US"/>
           </a:p>
@@ -8334,7 +8352,7 @@
           <a:p>
             <a:fld id="{3E31344D-F2C8-4FF6-8877-1B13E96E243A}" type="datetimeFigureOut">
               <a:rPr lang="en-US" smtClean="0"/>
-              <a:t>5/17/2023</a:t>
+              <a:t>5/25/2023</a:t>
             </a:fld>
             <a:endParaRPr lang="en-US"/>
           </a:p>
@@ -8571,7 +8589,7 @@
           <a:p>
             <a:fld id="{3E31344D-F2C8-4FF6-8877-1B13E96E243A}" type="datetimeFigureOut">
               <a:rPr lang="en-US" smtClean="0"/>
-              <a:t>5/17/2023</a:t>
+              <a:t>5/25/2023</a:t>
             </a:fld>
             <a:endParaRPr lang="en-US"/>
           </a:p>
@@ -9028,7 +9046,7 @@
           <a:p>
             <a:fld id="{3E31344D-F2C8-4FF6-8877-1B13E96E243A}" type="datetimeFigureOut">
               <a:rPr lang="en-US" smtClean="0"/>
-              <a:t>5/17/2023</a:t>
+              <a:t>5/25/2023</a:t>
             </a:fld>
             <a:endParaRPr lang="en-US"/>
           </a:p>
@@ -9219,7 +9237,7 @@
           <a:p>
             <a:fld id="{3E31344D-F2C8-4FF6-8877-1B13E96E243A}" type="datetimeFigureOut">
               <a:rPr lang="en-US" smtClean="0"/>
-              <a:t>5/17/2023</a:t>
+              <a:t>5/25/2023</a:t>
             </a:fld>
             <a:endParaRPr lang="en-US"/>
           </a:p>
@@ -9484,7 +9502,7 @@
           <a:p>
             <a:fld id="{3E31344D-F2C8-4FF6-8877-1B13E96E243A}" type="datetimeFigureOut">
               <a:rPr lang="en-US" smtClean="0"/>
-              <a:t>5/17/2023</a:t>
+              <a:t>5/25/2023</a:t>
             </a:fld>
             <a:endParaRPr lang="en-US"/>
           </a:p>
@@ -11857,7 +11875,7 @@
           <a:p>
             <a:fld id="{3E31344D-F2C8-4FF6-8877-1B13E96E243A}" type="datetimeFigureOut">
               <a:rPr lang="en-US" smtClean="0"/>
-              <a:t>5/17/2023</a:t>
+              <a:t>5/25/2023</a:t>
             </a:fld>
             <a:endParaRPr lang="en-US"/>
           </a:p>
@@ -12107,7 +12125,7 @@
           <a:p>
             <a:fld id="{3E31344D-F2C8-4FF6-8877-1B13E96E243A}" type="datetimeFigureOut">
               <a:rPr lang="en-US" smtClean="0"/>
-              <a:t>5/17/2023</a:t>
+              <a:t>5/25/2023</a:t>
             </a:fld>
             <a:endParaRPr lang="en-US"/>
           </a:p>
@@ -12493,7 +12511,7 @@
           <a:p>
             <a:fld id="{3E31344D-F2C8-4FF6-8877-1B13E96E243A}" type="datetimeFigureOut">
               <a:rPr lang="en-US" smtClean="0"/>
-              <a:t>5/17/2023</a:t>
+              <a:t>5/25/2023</a:t>
             </a:fld>
             <a:endParaRPr lang="en-US"/>
           </a:p>
@@ -12753,7 +12771,7 @@
           <a:p>
             <a:fld id="{3E31344D-F2C8-4FF6-8877-1B13E96E243A}" type="datetimeFigureOut">
               <a:rPr lang="en-US" smtClean="0"/>
-              <a:t>5/17/2023</a:t>
+              <a:t>5/25/2023</a:t>
             </a:fld>
             <a:endParaRPr lang="en-US"/>
           </a:p>
@@ -22086,36 +22104,6 @@
       </p:sp>
       <p:sp>
         <p:nvSpPr>
-          <p:cNvPr id="32773" name="Rectangle 3"/>
-          <p:cNvSpPr>
-            <a:spLocks noGrp="1" noChangeArrowheads="1"/>
-          </p:cNvSpPr>
-          <p:nvPr>
-            <p:ph sz="half" idx="1"/>
-          </p:nvPr>
-        </p:nvSpPr>
-        <p:spPr/>
-        <p:txBody>
-          <a:bodyPr/>
-          <a:lstStyle/>
-          <a:p>
-            <a:pPr marL="0" indent="0"/>
-            <a:endParaRPr lang="en-US" sz="2400" dirty="0">
-              <a:ea typeface="ＭＳ Ｐゴシック" pitchFamily="-106" charset="-128"/>
-              <a:cs typeface="ＭＳ Ｐゴシック" pitchFamily="-106" charset="-128"/>
-            </a:endParaRPr>
-          </a:p>
-          <a:p>
-            <a:pPr marL="0" indent="0"/>
-            <a:endParaRPr lang="de-DE" dirty="0">
-              <a:ea typeface="ＭＳ Ｐゴシック" pitchFamily="-106" charset="-128"/>
-              <a:cs typeface="ＭＳ Ｐゴシック" pitchFamily="-106" charset="-128"/>
-            </a:endParaRPr>
-          </a:p>
-        </p:txBody>
-      </p:sp>
-      <p:sp>
-        <p:nvSpPr>
           <p:cNvPr id="4" name="Content Placeholder 3"/>
           <p:cNvSpPr>
             <a:spLocks noGrp="1"/>
@@ -22354,7 +22342,7 @@
           <p:nvPr>
             <p:extLst>
               <p:ext uri="{D42A27DB-BD31-4B8C-83A1-F6EECF244321}">
-                <p14:modId xmlns:p14="http://schemas.microsoft.com/office/powerpoint/2010/main" val="1933940120"/>
+                <p14:modId xmlns:p14="http://schemas.microsoft.com/office/powerpoint/2010/main" val="1843422292"/>
               </p:ext>
             </p:extLst>
           </p:nvPr>
@@ -22367,7 +22355,7 @@
           <a:graphicData uri="http://schemas.openxmlformats.org/drawingml/2006/table">
             <a:tbl>
               <a:tblPr firstRow="1" bandRow="1">
-                <a:tableStyleId>{5C22544A-7EE6-4342-B048-85BDC9FD1C3A}</a:tableStyleId>
+                <a:tableStyleId>{00A15C55-8517-42AA-B614-E9B94910E393}</a:tableStyleId>
               </a:tblPr>
               <a:tblGrid>
                 <a:gridCol w="6489936">
@@ -22410,7 +22398,7 @@
                       </a:r>
                       <a:r>
                         <a:rPr lang="en-US" sz="2000" dirty="0"/>
-                        <a:t>It is raining today and windy today</a:t>
+                        <a:t>It is not raining today</a:t>
                       </a:r>
                     </a:p>
                   </a:txBody>
@@ -22429,8 +22417,12 @@
                     <a:lstStyle/>
                     <a:p>
                       <a:r>
+                        <a:rPr lang="en-US" sz="2000" b="1" dirty="0"/>
+                        <a:t>q:</a:t>
+                      </a:r>
+                      <a:r>
                         <a:rPr lang="en-US" sz="2000" dirty="0"/>
-                        <a:t>q: Then I will wear my raincoat</a:t>
+                        <a:t> Therefore, I will did not wear my raincoat</a:t>
                       </a:r>
                     </a:p>
                   </a:txBody>
@@ -22867,36 +22859,6 @@
       </p:sp>
       <p:sp>
         <p:nvSpPr>
-          <p:cNvPr id="32773" name="Rectangle 3"/>
-          <p:cNvSpPr>
-            <a:spLocks noGrp="1" noChangeArrowheads="1"/>
-          </p:cNvSpPr>
-          <p:nvPr>
-            <p:ph sz="half" idx="1"/>
-          </p:nvPr>
-        </p:nvSpPr>
-        <p:spPr/>
-        <p:txBody>
-          <a:bodyPr/>
-          <a:lstStyle/>
-          <a:p>
-            <a:pPr marL="0" indent="0"/>
-            <a:endParaRPr lang="en-US" sz="2400" dirty="0">
-              <a:ea typeface="ＭＳ Ｐゴシック" pitchFamily="-106" charset="-128"/>
-              <a:cs typeface="ＭＳ Ｐゴシック" pitchFamily="-106" charset="-128"/>
-            </a:endParaRPr>
-          </a:p>
-          <a:p>
-            <a:pPr marL="0" indent="0"/>
-            <a:endParaRPr lang="de-DE" dirty="0">
-              <a:ea typeface="ＭＳ Ｐゴシック" pitchFamily="-106" charset="-128"/>
-              <a:cs typeface="ＭＳ Ｐゴシック" pitchFamily="-106" charset="-128"/>
-            </a:endParaRPr>
-          </a:p>
-        </p:txBody>
-      </p:sp>
-      <p:sp>
-        <p:nvSpPr>
           <p:cNvPr id="4" name="Content Placeholder 3"/>
           <p:cNvSpPr>
             <a:spLocks noGrp="1"/>
@@ -22908,7 +22870,7 @@
         <p:spPr>
           <a:xfrm>
             <a:off x="485296" y="1531624"/>
-            <a:ext cx="11112864" cy="4585486"/>
+            <a:ext cx="11112864" cy="3466327"/>
           </a:xfrm>
         </p:spPr>
         <p:txBody>
@@ -23001,7 +22963,23 @@
             </a:pPr>
             <a:r>
               <a:rPr lang="en-US" sz="2000" dirty="0"/>
-              <a:t>A rule of inference drawn from the combination of modus ponens and the contrapositive.</a:t>
+              <a:t> It is a rule of inference drawn from the combination of </a:t>
+            </a:r>
+            <a:r>
+              <a:rPr lang="en-US" sz="2000" b="1" dirty="0"/>
+              <a:t>modus ponens </a:t>
+            </a:r>
+            <a:r>
+              <a:rPr lang="en-US" sz="2000" dirty="0"/>
+              <a:t>and the </a:t>
+            </a:r>
+            <a:r>
+              <a:rPr lang="en-US" sz="2000" b="1" dirty="0"/>
+              <a:t>contrapositive</a:t>
+            </a:r>
+            <a:r>
+              <a:rPr lang="en-US" sz="2000" dirty="0"/>
+              <a:t>.</a:t>
             </a:r>
           </a:p>
           <a:p>
@@ -23015,7 +22993,49 @@
                 <a:ea typeface="ＭＳ Ｐゴシック" pitchFamily="-106" charset="-128"/>
                 <a:cs typeface="ＭＳ Ｐゴシック" pitchFamily="-106" charset="-128"/>
               </a:rPr>
-              <a:t>If q is false, and if p implies q (</a:t>
+              <a:t>If </a:t>
+            </a:r>
+            <a:r>
+              <a:rPr lang="en-US" sz="1800" b="1" dirty="0">
+                <a:ea typeface="ＭＳ Ｐゴシック" pitchFamily="-106" charset="-128"/>
+                <a:cs typeface="ＭＳ Ｐゴシック" pitchFamily="-106" charset="-128"/>
+              </a:rPr>
+              <a:t>q</a:t>
+            </a:r>
+            <a:r>
+              <a:rPr lang="en-US" sz="1800" dirty="0">
+                <a:ea typeface="ＭＳ Ｐゴシック" pitchFamily="-106" charset="-128"/>
+                <a:cs typeface="ＭＳ Ｐゴシック" pitchFamily="-106" charset="-128"/>
+              </a:rPr>
+              <a:t> is false, and if </a:t>
+            </a:r>
+            <a:r>
+              <a:rPr lang="en-US" sz="1800" b="1" dirty="0">
+                <a:ea typeface="ＭＳ Ｐゴシック" pitchFamily="-106" charset="-128"/>
+                <a:cs typeface="ＭＳ Ｐゴシック" pitchFamily="-106" charset="-128"/>
+              </a:rPr>
+              <a:t>p</a:t>
+            </a:r>
+            <a:r>
+              <a:rPr lang="en-US" sz="1800" dirty="0">
+                <a:ea typeface="ＭＳ Ｐゴシック" pitchFamily="-106" charset="-128"/>
+                <a:cs typeface="ＭＳ Ｐゴシック" pitchFamily="-106" charset="-128"/>
+              </a:rPr>
+              <a:t> implies </a:t>
+            </a:r>
+            <a:r>
+              <a:rPr lang="en-US" sz="1800" b="1" dirty="0">
+                <a:ea typeface="ＭＳ Ｐゴシック" pitchFamily="-106" charset="-128"/>
+                <a:cs typeface="ＭＳ Ｐゴシック" pitchFamily="-106" charset="-128"/>
+              </a:rPr>
+              <a:t>q</a:t>
+            </a:r>
+            <a:r>
+              <a:rPr lang="en-US" sz="1800" dirty="0">
+                <a:ea typeface="ＭＳ Ｐゴシック" pitchFamily="-106" charset="-128"/>
+                <a:cs typeface="ＭＳ Ｐゴシック" pitchFamily="-106" charset="-128"/>
+              </a:rPr>
+              <a:t> (</a:t>
             </a:r>
             <a:r>
               <a:rPr lang="en-US" sz="1800" dirty="0" err="1">
@@ -23029,7 +23049,21 @@
                 <a:ea typeface="ＭＳ Ｐゴシック" pitchFamily="-106" charset="-128"/>
                 <a:cs typeface="ＭＳ Ｐゴシック" pitchFamily="-106" charset="-128"/>
               </a:rPr>
-              <a:t>), then p is also false.</a:t>
+              <a:t>), then </a:t>
+            </a:r>
+            <a:r>
+              <a:rPr lang="en-US" sz="1800" b="1" dirty="0">
+                <a:ea typeface="ＭＳ Ｐゴシック" pitchFamily="-106" charset="-128"/>
+                <a:cs typeface="ＭＳ Ｐゴシック" pitchFamily="-106" charset="-128"/>
+              </a:rPr>
+              <a:t>p</a:t>
+            </a:r>
+            <a:r>
+              <a:rPr lang="en-US" sz="1800" dirty="0">
+                <a:ea typeface="ＭＳ Ｐゴシック" pitchFamily="-106" charset="-128"/>
+                <a:cs typeface="ＭＳ Ｐゴシック" pitchFamily="-106" charset="-128"/>
+              </a:rPr>
+              <a:t> is also false.</a:t>
             </a:r>
           </a:p>
           <a:p>
@@ -23162,14 +23196,14 @@
           <p:nvPr>
             <p:extLst>
               <p:ext uri="{D42A27DB-BD31-4B8C-83A1-F6EECF244321}">
-                <p14:modId xmlns:p14="http://schemas.microsoft.com/office/powerpoint/2010/main" val="482634042"/>
+                <p14:modId xmlns:p14="http://schemas.microsoft.com/office/powerpoint/2010/main" val="1015194408"/>
               </p:ext>
             </p:extLst>
           </p:nvPr>
         </p:nvGraphicFramePr>
         <p:xfrm>
-          <a:off x="2453343" y="5222391"/>
-          <a:ext cx="6913682" cy="1188720"/>
+          <a:off x="240244" y="5258743"/>
+          <a:ext cx="4961480" cy="1455256"/>
         </p:xfrm>
         <a:graphic>
           <a:graphicData uri="http://schemas.openxmlformats.org/drawingml/2006/table">
@@ -23178,7 +23212,7 @@
                 <a:tableStyleId>{5C22544A-7EE6-4342-B048-85BDC9FD1C3A}</a:tableStyleId>
               </a:tblPr>
               <a:tblGrid>
-                <a:gridCol w="6913682">
+                <a:gridCol w="4961480">
                   <a:extLst>
                     <a:ext uri="{9D8B030D-6E8A-4147-A177-3AD203B41FA5}">
                       <a16:colId xmlns:a16="http://schemas.microsoft.com/office/drawing/2014/main" val="2198883209"/>
@@ -23186,7 +23220,7 @@
                   </a:extLst>
                 </a:gridCol>
               </a:tblGrid>
-              <a:tr h="370840">
+              <a:tr h="529508">
                 <a:tc>
                   <a:txBody>
                     <a:bodyPr/>
@@ -23206,7 +23240,7 @@
                   </a:ext>
                 </a:extLst>
               </a:tr>
-              <a:tr h="370840">
+              <a:tr h="369740">
                 <a:tc>
                   <a:txBody>
                     <a:bodyPr/>
@@ -23218,7 +23252,7 @@
                       </a:r>
                       <a:r>
                         <a:rPr lang="en-US" sz="2000" dirty="0"/>
-                        <a:t> I will not wear my raincoat</a:t>
+                        <a:t> I did not wear my raincoat</a:t>
                       </a:r>
                     </a:p>
                   </a:txBody>
@@ -23230,7 +23264,7 @@
                   </a:ext>
                 </a:extLst>
               </a:tr>
-              <a:tr h="370840">
+              <a:tr h="529508">
                 <a:tc>
                   <a:txBody>
                     <a:bodyPr/>
@@ -23238,19 +23272,11 @@
                     <a:p>
                       <a:r>
                         <a:rPr lang="en-US" sz="2000" b="1" dirty="0"/>
-                        <a:t>not q:</a:t>
+                        <a:t>q:</a:t>
                       </a:r>
                       <a:r>
                         <a:rPr lang="en-US" sz="2000" dirty="0"/>
-                        <a:t> Therefore, it is </a:t>
-                      </a:r>
-                      <a:r>
-                        <a:rPr lang="en-US" sz="2000" b="1" dirty="0"/>
-                        <a:t>not</a:t>
-                      </a:r>
-                      <a:r>
-                        <a:rPr lang="en-US" sz="2000" dirty="0"/>
-                        <a:t> raining today</a:t>
+                        <a:t> Therefore, it is not raining today</a:t>
                       </a:r>
                     </a:p>
                   </a:txBody>
@@ -23266,6 +23292,166 @@
           </a:graphicData>
         </a:graphic>
       </p:graphicFrame>
+      <p:sp>
+        <p:nvSpPr>
+          <p:cNvPr id="10" name="TextBox 9">
+            <a:extLst>
+              <a:ext uri="{FF2B5EF4-FFF2-40B4-BE49-F238E27FC236}">
+                <a16:creationId xmlns:a16="http://schemas.microsoft.com/office/drawing/2014/main" id="{23E4CD98-A179-5292-F57C-18EF64502B71}"/>
+              </a:ext>
+            </a:extLst>
+          </p:cNvPr>
+          <p:cNvSpPr txBox="1"/>
+          <p:nvPr/>
+        </p:nvSpPr>
+        <p:spPr bwMode="gray">
+          <a:xfrm>
+            <a:off x="5584397" y="5258743"/>
+            <a:ext cx="6445233" cy="1228062"/>
+          </a:xfrm>
+          <a:prstGeom prst="rect">
+            <a:avLst/>
+          </a:prstGeom>
+          <a:noFill/>
+          <a:ln>
+            <a:solidFill>
+              <a:schemeClr val="accent5"/>
+            </a:solidFill>
+          </a:ln>
+        </p:spPr>
+        <p:txBody>
+          <a:bodyPr wrap="square" lIns="91440" tIns="91440" rIns="91440" bIns="91440" rtlCol="0">
+            <a:noAutofit/>
+          </a:bodyPr>
+          <a:lstStyle/>
+          <a:p>
+            <a:pPr>
+              <a:spcBef>
+                <a:spcPts val="300"/>
+              </a:spcBef>
+              <a:spcAft>
+                <a:spcPts val="300"/>
+              </a:spcAft>
+              <a:buClr>
+                <a:schemeClr val="accent1"/>
+              </a:buClr>
+              <a:buSzPct val="90000"/>
+            </a:pPr>
+            <a:r>
+              <a:rPr lang="en-US" dirty="0"/>
+              <a:t>From </a:t>
+            </a:r>
+            <a:r>
+              <a:rPr lang="en-US" b="1" dirty="0">
+                <a:solidFill>
+                  <a:srgbClr val="C00000"/>
+                </a:solidFill>
+              </a:rPr>
+              <a:t>modus tollens</a:t>
+            </a:r>
+            <a:r>
+              <a:rPr lang="en-US" dirty="0"/>
+              <a:t>, </a:t>
+            </a:r>
+          </a:p>
+          <a:p>
+            <a:pPr>
+              <a:spcBef>
+                <a:spcPts val="300"/>
+              </a:spcBef>
+              <a:spcAft>
+                <a:spcPts val="300"/>
+              </a:spcAft>
+              <a:buClr>
+                <a:schemeClr val="accent1"/>
+              </a:buClr>
+              <a:buSzPct val="90000"/>
+            </a:pPr>
+            <a:r>
+              <a:rPr lang="en-US" dirty="0"/>
+              <a:t>if </a:t>
+            </a:r>
+            <a:r>
+              <a:rPr lang="en-US" b="1" dirty="0"/>
+              <a:t>q is false</a:t>
+            </a:r>
+            <a:r>
+              <a:rPr lang="en-US" dirty="0"/>
+              <a:t> (i.e., it is raining today), </a:t>
+            </a:r>
+          </a:p>
+          <a:p>
+            <a:pPr>
+              <a:spcBef>
+                <a:spcPts val="300"/>
+              </a:spcBef>
+              <a:spcAft>
+                <a:spcPts val="300"/>
+              </a:spcAft>
+              <a:buClr>
+                <a:schemeClr val="accent1"/>
+              </a:buClr>
+              <a:buSzPct val="90000"/>
+            </a:pPr>
+            <a:r>
+              <a:rPr lang="en-US" dirty="0"/>
+              <a:t>then </a:t>
+            </a:r>
+            <a:r>
+              <a:rPr lang="en-US" b="1" dirty="0"/>
+              <a:t>p is also false</a:t>
+            </a:r>
+            <a:r>
+              <a:rPr lang="en-US" dirty="0"/>
+              <a:t> (i.e., I am wearing my raincoat)</a:t>
+            </a:r>
+          </a:p>
+        </p:txBody>
+      </p:sp>
+      <p:cxnSp>
+        <p:nvCxnSpPr>
+          <p:cNvPr id="12" name="Connector: Elbow 11">
+            <a:extLst>
+              <a:ext uri="{FF2B5EF4-FFF2-40B4-BE49-F238E27FC236}">
+                <a16:creationId xmlns:a16="http://schemas.microsoft.com/office/drawing/2014/main" id="{0F730CD3-2ED6-2F7C-0091-A25D91254321}"/>
+              </a:ext>
+            </a:extLst>
+          </p:cNvPr>
+          <p:cNvCxnSpPr>
+            <a:endCxn id="10" idx="0"/>
+          </p:cNvCxnSpPr>
+          <p:nvPr/>
+        </p:nvCxnSpPr>
+        <p:spPr bwMode="gray">
+          <a:xfrm>
+            <a:off x="7550590" y="4227968"/>
+            <a:ext cx="1256424" cy="1030775"/>
+          </a:xfrm>
+          <a:prstGeom prst="bentConnector2">
+            <a:avLst/>
+          </a:prstGeom>
+          <a:ln>
+            <a:solidFill>
+              <a:schemeClr val="accent5"/>
+            </a:solidFill>
+            <a:tailEnd type="triangle"/>
+          </a:ln>
+        </p:spPr>
+        <p:style>
+          <a:lnRef idx="1">
+            <a:schemeClr val="accent1"/>
+          </a:lnRef>
+          <a:fillRef idx="0">
+            <a:schemeClr val="accent1"/>
+          </a:fillRef>
+          <a:effectRef idx="0">
+            <a:schemeClr val="accent1"/>
+          </a:effectRef>
+          <a:fontRef idx="minor">
+            <a:schemeClr val="tx1"/>
+          </a:fontRef>
+        </p:style>
+      </p:cxnSp>
     </p:spTree>
     <p:extLst>
       <p:ext uri="{BB962C8B-B14F-4D97-AF65-F5344CB8AC3E}">

</xml_diff>